<commit_message>
add pictures to power point
</commit_message>
<xml_diff>
--- a/Project Par 3.pptx
+++ b/Project Par 3.pptx
@@ -8,8 +8,8 @@
     <p:sldId id="256" r:id="rId2"/>
     <p:sldId id="258" r:id="rId3"/>
     <p:sldId id="259" r:id="rId4"/>
-    <p:sldId id="260" r:id="rId5"/>
-    <p:sldId id="261" r:id="rId6"/>
+    <p:sldId id="261" r:id="rId5"/>
+    <p:sldId id="260" r:id="rId6"/>
     <p:sldId id="262" r:id="rId7"/>
   </p:sldIdLst>
   <p:sldSz cx="12192000" cy="6858000"/>
@@ -109,6 +109,11 @@
       </a:defRPr>
     </a:lvl9pPr>
   </p:defaultTextStyle>
+  <p:extLst>
+    <p:ext uri="{EFAFB233-063F-42B5-8137-9DF3F51BA10A}">
+      <p15:sldGuideLst xmlns:p15="http://schemas.microsoft.com/office/powerpoint/2012/main"/>
+    </p:ext>
+  </p:extLst>
 </p:presentation>
 </file>
 
@@ -4212,6 +4217,45 @@
           <a:chExt cx="0" cy="0"/>
         </a:xfrm>
       </p:grpSpPr>
+      <p:pic>
+        <p:nvPicPr>
+          <p:cNvPr id="3" name="Picture 2" descr="A person on a golf course&#10;&#10;Description automatically generated with medium confidence">
+            <a:extLst>
+              <a:ext uri="{FF2B5EF4-FFF2-40B4-BE49-F238E27FC236}">
+                <a16:creationId xmlns:a16="http://schemas.microsoft.com/office/drawing/2014/main" id="{3F4BD7F5-C993-8ACF-F338-A25F5F1E866D}"/>
+              </a:ext>
+            </a:extLst>
+          </p:cNvPr>
+          <p:cNvPicPr>
+            <a:picLocks noChangeAspect="1"/>
+          </p:cNvPicPr>
+          <p:nvPr/>
+        </p:nvPicPr>
+        <p:blipFill>
+          <a:blip r:embed="rId2">
+            <a:extLst>
+              <a:ext uri="{28A0092B-C50C-407E-A947-70E740481C1C}">
+                <a14:useLocalDpi xmlns:a14="http://schemas.microsoft.com/office/drawing/2010/main" val="0"/>
+              </a:ext>
+              <a:ext uri="{837473B0-CC2E-450A-ABE3-18F120FF3D39}">
+                <a1611:picAttrSrcUrl xmlns:a1611="http://schemas.microsoft.com/office/drawing/2016/11/main" r:id="rId3"/>
+              </a:ext>
+            </a:extLst>
+          </a:blip>
+          <a:stretch>
+            <a:fillRect/>
+          </a:stretch>
+        </p:blipFill>
+        <p:spPr>
+          <a:xfrm>
+            <a:off x="0" y="0"/>
+            <a:ext cx="12192000" cy="6857999"/>
+          </a:xfrm>
+          <a:prstGeom prst="rect">
+            <a:avLst/>
+          </a:prstGeom>
+        </p:spPr>
+      </p:pic>
       <p:sp>
         <p:nvSpPr>
           <p:cNvPr id="8" name="Title 11">
@@ -4241,7 +4285,14 @@
           <a:lstStyle/>
           <a:p>
             <a:r>
-              <a:rPr lang="en-US" sz="4800" dirty="0"/>
+              <a:rPr lang="en-US" sz="4800" dirty="0">
+                <a:solidFill>
+                  <a:schemeClr val="accent5">
+                    <a:lumMod val="20000"/>
+                    <a:lumOff val="80000"/>
+                  </a:schemeClr>
+                </a:solidFill>
+              </a:rPr>
               <a:t>What Sets the Top Golfers Apart?</a:t>
             </a:r>
           </a:p>
@@ -4274,7 +4325,14 @@
           <a:lstStyle/>
           <a:p>
             <a:r>
-              <a:rPr lang="en-US" dirty="0"/>
+              <a:rPr lang="en-US" dirty="0">
+                <a:solidFill>
+                  <a:schemeClr val="accent5">
+                    <a:lumMod val="20000"/>
+                    <a:lumOff val="80000"/>
+                  </a:schemeClr>
+                </a:solidFill>
+              </a:rPr>
               <a:t>Examining Statistics of the Worlds Top Golfs</a:t>
             </a:r>
           </a:p>
@@ -4339,7 +4397,7 @@
           <p:nvPr/>
         </p:nvPicPr>
         <p:blipFill>
-          <a:blip r:embed="rId2"/>
+          <a:blip r:embed="rId4"/>
           <a:stretch>
             <a:fillRect/>
           </a:stretch>
@@ -4384,6 +4442,45 @@
           <a:chExt cx="0" cy="0"/>
         </a:xfrm>
       </p:grpSpPr>
+      <p:pic>
+        <p:nvPicPr>
+          <p:cNvPr id="9" name="Picture 8" descr="A large grassy field with trees&#10;&#10;Description automatically generated with low confidence">
+            <a:extLst>
+              <a:ext uri="{FF2B5EF4-FFF2-40B4-BE49-F238E27FC236}">
+                <a16:creationId xmlns:a16="http://schemas.microsoft.com/office/drawing/2014/main" id="{90761D53-C7F8-4EA6-FA8B-A24D270AAC25}"/>
+              </a:ext>
+            </a:extLst>
+          </p:cNvPr>
+          <p:cNvPicPr>
+            <a:picLocks noChangeAspect="1"/>
+          </p:cNvPicPr>
+          <p:nvPr/>
+        </p:nvPicPr>
+        <p:blipFill>
+          <a:blip r:embed="rId2">
+            <a:extLst>
+              <a:ext uri="{28A0092B-C50C-407E-A947-70E740481C1C}">
+                <a14:useLocalDpi xmlns:a14="http://schemas.microsoft.com/office/drawing/2010/main" val="0"/>
+              </a:ext>
+              <a:ext uri="{837473B0-CC2E-450A-ABE3-18F120FF3D39}">
+                <a1611:picAttrSrcUrl xmlns:a1611="http://schemas.microsoft.com/office/drawing/2016/11/main" r:id="rId3"/>
+              </a:ext>
+            </a:extLst>
+          </a:blip>
+          <a:stretch>
+            <a:fillRect/>
+          </a:stretch>
+        </p:blipFill>
+        <p:spPr>
+          <a:xfrm>
+            <a:off x="0" y="0"/>
+            <a:ext cx="12192000" cy="6913756"/>
+          </a:xfrm>
+          <a:prstGeom prst="rect">
+            <a:avLst/>
+          </a:prstGeom>
+        </p:spPr>
+      </p:pic>
       <p:sp>
         <p:nvSpPr>
           <p:cNvPr id="4" name="Title 3">
@@ -4413,10 +4510,13 @@
           <a:lstStyle/>
           <a:p>
             <a:r>
-              <a:rPr lang="en-US"/>
+              <a:rPr lang="en-US" dirty="0">
+                <a:solidFill>
+                  <a:schemeClr val="bg1"/>
+                </a:solidFill>
+              </a:rPr>
               <a:t>What to look at?</a:t>
             </a:r>
-            <a:endParaRPr lang="en-US" dirty="0"/>
           </a:p>
         </p:txBody>
       </p:sp>
@@ -4437,7 +4537,7 @@
           </p:nvPr>
         </p:nvPicPr>
         <p:blipFill>
-          <a:blip r:embed="rId2"/>
+          <a:blip r:embed="rId4"/>
           <a:stretch>
             <a:fillRect/>
           </a:stretch>
@@ -4479,33 +4579,57 @@
           <a:lstStyle/>
           <a:p>
             <a:r>
-              <a:rPr lang="en-US" dirty="0"/>
+              <a:rPr lang="en-US" dirty="0">
+                <a:solidFill>
+                  <a:schemeClr val="bg1"/>
+                </a:solidFill>
+              </a:rPr>
               <a:t>Started with a csv/</a:t>
             </a:r>
             <a:r>
-              <a:rPr lang="en-US" dirty="0" err="1"/>
+              <a:rPr lang="en-US" dirty="0" err="1">
+                <a:solidFill>
+                  <a:schemeClr val="bg1"/>
+                </a:solidFill>
+              </a:rPr>
               <a:t>json</a:t>
             </a:r>
             <a:r>
-              <a:rPr lang="en-US" dirty="0"/>
+              <a:rPr lang="en-US" dirty="0">
+                <a:solidFill>
+                  <a:schemeClr val="bg1"/>
+                </a:solidFill>
+              </a:rPr>
               <a:t> of 111 different statistics and 1619 golfers</a:t>
             </a:r>
           </a:p>
           <a:p>
             <a:r>
-              <a:rPr lang="en-US" dirty="0"/>
+              <a:rPr lang="en-US" dirty="0">
+                <a:solidFill>
+                  <a:schemeClr val="bg1"/>
+                </a:solidFill>
+              </a:rPr>
               <a:t>Cleaned data to 10 important categories and merged with world golf rankings top 200</a:t>
             </a:r>
           </a:p>
           <a:p>
             <a:r>
-              <a:rPr lang="en-US" dirty="0"/>
+              <a:rPr lang="en-US" dirty="0">
+                <a:solidFill>
+                  <a:schemeClr val="bg1"/>
+                </a:solidFill>
+              </a:rPr>
               <a:t>Dropped any golfer missing data leaving us with a final 117 golfers</a:t>
             </a:r>
           </a:p>
           <a:p>
             <a:r>
-              <a:rPr lang="en-US" dirty="0"/>
+              <a:rPr lang="en-US" dirty="0">
+                <a:solidFill>
+                  <a:schemeClr val="bg1"/>
+                </a:solidFill>
+              </a:rPr>
               <a:t>Statistics only include PGA Tour Golfers, LIV Tour Players were excluded</a:t>
             </a:r>
           </a:p>
@@ -4585,140 +4709,45 @@
           <a:chExt cx="0" cy="0"/>
         </a:xfrm>
       </p:grpSpPr>
-      <p:sp>
-        <p:nvSpPr>
-          <p:cNvPr id="2" name="Title 1">
-            <a:extLst>
-              <a:ext uri="{FF2B5EF4-FFF2-40B4-BE49-F238E27FC236}">
-                <a16:creationId xmlns:a16="http://schemas.microsoft.com/office/drawing/2014/main" id="{EDD8CE05-5F75-0442-20F7-9A04674AA2B1}"/>
-              </a:ext>
-            </a:extLst>
-          </p:cNvPr>
-          <p:cNvSpPr>
-            <a:spLocks noGrp="1"/>
-          </p:cNvSpPr>
-          <p:nvPr>
-            <p:ph type="title"/>
-          </p:nvPr>
-        </p:nvSpPr>
-        <p:spPr>
-          <a:xfrm>
-            <a:off x="226290" y="308768"/>
-            <a:ext cx="10092477" cy="953669"/>
-          </a:xfrm>
-        </p:spPr>
-        <p:txBody>
-          <a:bodyPr/>
-          <a:lstStyle/>
-          <a:p>
-            <a:r>
-              <a:rPr lang="en-US" dirty="0"/>
-              <a:t>Comparing Players Head-to-Head</a:t>
-            </a:r>
-          </a:p>
-        </p:txBody>
-      </p:sp>
-      <p:sp>
-        <p:nvSpPr>
-          <p:cNvPr id="10" name="Content Placeholder 9">
-            <a:extLst>
-              <a:ext uri="{FF2B5EF4-FFF2-40B4-BE49-F238E27FC236}">
-                <a16:creationId xmlns:a16="http://schemas.microsoft.com/office/drawing/2014/main" id="{A41DBB27-480C-9D7F-7B76-88B3FAE63957}"/>
-              </a:ext>
-            </a:extLst>
-          </p:cNvPr>
-          <p:cNvSpPr>
-            <a:spLocks noGrp="1"/>
-          </p:cNvSpPr>
-          <p:nvPr>
-            <p:ph sz="half" idx="1"/>
-          </p:nvPr>
-        </p:nvSpPr>
-        <p:spPr>
-          <a:xfrm>
-            <a:off x="7887853" y="308768"/>
-            <a:ext cx="3539483" cy="2582214"/>
-          </a:xfrm>
-        </p:spPr>
-        <p:txBody>
-          <a:bodyPr/>
-          <a:lstStyle/>
-          <a:p>
-            <a:r>
-              <a:rPr lang="en-US" dirty="0"/>
-              <a:t>Created a drop-down menu to select each player to display their stats for each category</a:t>
-            </a:r>
-          </a:p>
-          <a:p>
-            <a:r>
-              <a:rPr lang="en-US" dirty="0"/>
-              <a:t>Can use this to compare each player to see where they excel</a:t>
-            </a:r>
-          </a:p>
-        </p:txBody>
-      </p:sp>
       <p:pic>
         <p:nvPicPr>
-          <p:cNvPr id="13" name="Content Placeholder 12">
-            <a:extLst>
-              <a:ext uri="{FF2B5EF4-FFF2-40B4-BE49-F238E27FC236}">
-                <a16:creationId xmlns:a16="http://schemas.microsoft.com/office/drawing/2014/main" id="{2E35E8E0-29DE-C1D6-1E5B-05466745A7D4}"/>
+          <p:cNvPr id="4" name="Picture 3" descr="A golf cart parked on a golf course&#10;&#10;Description automatically generated with low confidence">
+            <a:extLst>
+              <a:ext uri="{FF2B5EF4-FFF2-40B4-BE49-F238E27FC236}">
+                <a16:creationId xmlns:a16="http://schemas.microsoft.com/office/drawing/2014/main" id="{13348BD9-2BD9-D737-11A3-B1386E4C8F8D}"/>
               </a:ext>
             </a:extLst>
           </p:cNvPr>
           <p:cNvPicPr>
-            <a:picLocks noGrp="1" noChangeAspect="1"/>
+            <a:picLocks noChangeAspect="1"/>
           </p:cNvPicPr>
-          <p:nvPr>
-            <p:ph sz="half" idx="2"/>
-          </p:nvPr>
+          <p:nvPr/>
         </p:nvPicPr>
         <p:blipFill>
-          <a:blip r:embed="rId2"/>
+          <a:blip r:embed="rId2">
+            <a:extLst>
+              <a:ext uri="{28A0092B-C50C-407E-A947-70E740481C1C}">
+                <a14:useLocalDpi xmlns:a14="http://schemas.microsoft.com/office/drawing/2010/main" val="0"/>
+              </a:ext>
+              <a:ext uri="{837473B0-CC2E-450A-ABE3-18F120FF3D39}">
+                <a1611:picAttrSrcUrl xmlns:a1611="http://schemas.microsoft.com/office/drawing/2016/11/main" r:id="rId3"/>
+              </a:ext>
+            </a:extLst>
+          </a:blip>
           <a:stretch>
             <a:fillRect/>
           </a:stretch>
         </p:blipFill>
         <p:spPr>
           <a:xfrm>
-            <a:off x="494146" y="2890982"/>
-            <a:ext cx="8271164" cy="3370379"/>
+            <a:off x="1" y="0"/>
+            <a:ext cx="12258906" cy="6858000"/>
           </a:xfrm>
           <a:prstGeom prst="rect">
             <a:avLst/>
           </a:prstGeom>
         </p:spPr>
       </p:pic>
-    </p:spTree>
-    <p:extLst>
-      <p:ext uri="{BB962C8B-B14F-4D97-AF65-F5344CB8AC3E}">
-        <p14:creationId xmlns:p14="http://schemas.microsoft.com/office/powerpoint/2010/main" val="3394728805"/>
-      </p:ext>
-    </p:extLst>
-  </p:cSld>
-  <p:clrMapOvr>
-    <a:masterClrMapping/>
-  </p:clrMapOvr>
-</p:sld>
-</file>
-
-<file path=ppt/slides/slide5.xml><?xml version="1.0" encoding="utf-8"?>
-<p:sld xmlns:a="http://schemas.openxmlformats.org/drawingml/2006/main" xmlns:r="http://schemas.openxmlformats.org/officeDocument/2006/relationships" xmlns:p="http://schemas.openxmlformats.org/presentationml/2006/main">
-  <p:cSld>
-    <p:spTree>
-      <p:nvGrpSpPr>
-        <p:cNvPr id="1" name=""/>
-        <p:cNvGrpSpPr/>
-        <p:nvPr/>
-      </p:nvGrpSpPr>
-      <p:grpSpPr>
-        <a:xfrm>
-          <a:off x="0" y="0"/>
-          <a:ext cx="0" cy="0"/>
-          <a:chOff x="0" y="0"/>
-          <a:chExt cx="0" cy="0"/>
-        </a:xfrm>
-      </p:grpSpPr>
       <p:sp>
         <p:nvSpPr>
           <p:cNvPr id="2" name="Title 1">
@@ -4741,7 +4770,11 @@
           <a:lstStyle/>
           <a:p>
             <a:r>
-              <a:rPr lang="en-US" dirty="0"/>
+              <a:rPr lang="en-US" dirty="0">
+                <a:solidFill>
+                  <a:schemeClr val="bg1"/>
+                </a:solidFill>
+              </a:rPr>
               <a:t>Comparing Groups of Players</a:t>
             </a:r>
           </a:p>
@@ -4764,7 +4797,7 @@
           </p:nvPr>
         </p:nvPicPr>
         <p:blipFill>
-          <a:blip r:embed="rId2">
+          <a:blip r:embed="rId4">
             <a:extLst>
               <a:ext uri="{28A0092B-C50C-407E-A947-70E740481C1C}">
                 <a14:useLocalDpi xmlns:a14="http://schemas.microsoft.com/office/drawing/2010/main" val="0"/>
@@ -4815,7 +4848,11 @@
               <a:buChar char="•"/>
             </a:pPr>
             <a:r>
-              <a:rPr lang="en-US" dirty="0"/>
+              <a:rPr lang="en-US" dirty="0">
+                <a:solidFill>
+                  <a:schemeClr val="bg1"/>
+                </a:solidFill>
+              </a:rPr>
               <a:t>Next, we compared the averages of different groups of players based on their World Golf Ranking</a:t>
             </a:r>
           </a:p>
@@ -4825,7 +4862,11 @@
               <a:buChar char="•"/>
             </a:pPr>
             <a:r>
-              <a:rPr lang="en-US" dirty="0"/>
+              <a:rPr lang="en-US" dirty="0">
+                <a:solidFill>
+                  <a:schemeClr val="bg1"/>
+                </a:solidFill>
+              </a:rPr>
               <a:t>The groups are Top 10, 11-25, 26-50, 51-100 and Over 100 </a:t>
             </a:r>
           </a:p>
@@ -4848,7 +4889,7 @@
           </p:nvPr>
         </p:nvPicPr>
         <p:blipFill>
-          <a:blip r:embed="rId3">
+          <a:blip r:embed="rId5">
             <a:extLst>
               <a:ext uri="{28A0092B-C50C-407E-A947-70E740481C1C}">
                 <a14:useLocalDpi xmlns:a14="http://schemas.microsoft.com/office/drawing/2010/main" val="0"/>
@@ -4893,6 +4934,198 @@
 </p:sld>
 </file>
 
+<file path=ppt/slides/slide5.xml><?xml version="1.0" encoding="utf-8"?>
+<p:sld xmlns:a="http://schemas.openxmlformats.org/drawingml/2006/main" xmlns:r="http://schemas.openxmlformats.org/officeDocument/2006/relationships" xmlns:p="http://schemas.openxmlformats.org/presentationml/2006/main">
+  <p:cSld>
+    <p:spTree>
+      <p:nvGrpSpPr>
+        <p:cNvPr id="1" name=""/>
+        <p:cNvGrpSpPr/>
+        <p:nvPr/>
+      </p:nvGrpSpPr>
+      <p:grpSpPr>
+        <a:xfrm>
+          <a:off x="0" y="0"/>
+          <a:ext cx="0" cy="0"/>
+          <a:chOff x="0" y="0"/>
+          <a:chExt cx="0" cy="0"/>
+        </a:xfrm>
+      </p:grpSpPr>
+      <p:pic>
+        <p:nvPicPr>
+          <p:cNvPr id="4" name="Picture 3" descr="A person swinging a golf club&#10;&#10;Description automatically generated with medium confidence">
+            <a:extLst>
+              <a:ext uri="{FF2B5EF4-FFF2-40B4-BE49-F238E27FC236}">
+                <a16:creationId xmlns:a16="http://schemas.microsoft.com/office/drawing/2014/main" id="{36CAC396-0DD5-A218-AD86-418ED8B67C1E}"/>
+              </a:ext>
+            </a:extLst>
+          </p:cNvPr>
+          <p:cNvPicPr>
+            <a:picLocks noChangeAspect="1"/>
+          </p:cNvPicPr>
+          <p:nvPr/>
+        </p:nvPicPr>
+        <p:blipFill>
+          <a:blip r:embed="rId2">
+            <a:extLst>
+              <a:ext uri="{28A0092B-C50C-407E-A947-70E740481C1C}">
+                <a14:useLocalDpi xmlns:a14="http://schemas.microsoft.com/office/drawing/2010/main" val="0"/>
+              </a:ext>
+              <a:ext uri="{837473B0-CC2E-450A-ABE3-18F120FF3D39}">
+                <a1611:picAttrSrcUrl xmlns:a1611="http://schemas.microsoft.com/office/drawing/2016/11/main" r:id="rId3"/>
+              </a:ext>
+            </a:extLst>
+          </a:blip>
+          <a:stretch>
+            <a:fillRect/>
+          </a:stretch>
+        </p:blipFill>
+        <p:spPr>
+          <a:xfrm>
+            <a:off x="-59474" y="0"/>
+            <a:ext cx="12251473" cy="6858000"/>
+          </a:xfrm>
+          <a:prstGeom prst="rect">
+            <a:avLst/>
+          </a:prstGeom>
+          <a:effectLst>
+            <a:outerShdw blurRad="50800" dist="50800" dir="5400000" algn="ctr" rotWithShape="0">
+              <a:srgbClr val="000000"/>
+            </a:outerShdw>
+          </a:effectLst>
+        </p:spPr>
+      </p:pic>
+      <p:sp>
+        <p:nvSpPr>
+          <p:cNvPr id="2" name="Title 1">
+            <a:extLst>
+              <a:ext uri="{FF2B5EF4-FFF2-40B4-BE49-F238E27FC236}">
+                <a16:creationId xmlns:a16="http://schemas.microsoft.com/office/drawing/2014/main" id="{EDD8CE05-5F75-0442-20F7-9A04674AA2B1}"/>
+              </a:ext>
+            </a:extLst>
+          </p:cNvPr>
+          <p:cNvSpPr>
+            <a:spLocks noGrp="1"/>
+          </p:cNvSpPr>
+          <p:nvPr>
+            <p:ph type="title"/>
+          </p:nvPr>
+        </p:nvSpPr>
+        <p:spPr>
+          <a:xfrm>
+            <a:off x="226290" y="308768"/>
+            <a:ext cx="10092477" cy="953669"/>
+          </a:xfrm>
+        </p:spPr>
+        <p:txBody>
+          <a:bodyPr/>
+          <a:lstStyle/>
+          <a:p>
+            <a:r>
+              <a:rPr lang="en-US" dirty="0"/>
+              <a:t>Comparing Players Head-to-Head</a:t>
+            </a:r>
+          </a:p>
+        </p:txBody>
+      </p:sp>
+      <p:sp>
+        <p:nvSpPr>
+          <p:cNvPr id="10" name="Content Placeholder 9">
+            <a:extLst>
+              <a:ext uri="{FF2B5EF4-FFF2-40B4-BE49-F238E27FC236}">
+                <a16:creationId xmlns:a16="http://schemas.microsoft.com/office/drawing/2014/main" id="{A41DBB27-480C-9D7F-7B76-88B3FAE63957}"/>
+              </a:ext>
+            </a:extLst>
+          </p:cNvPr>
+          <p:cNvSpPr>
+            <a:spLocks noGrp="1"/>
+          </p:cNvSpPr>
+          <p:nvPr>
+            <p:ph sz="half" idx="1"/>
+          </p:nvPr>
+        </p:nvSpPr>
+        <p:spPr>
+          <a:xfrm>
+            <a:off x="7887853" y="308768"/>
+            <a:ext cx="3539483" cy="2582214"/>
+          </a:xfrm>
+        </p:spPr>
+        <p:txBody>
+          <a:bodyPr/>
+          <a:lstStyle/>
+          <a:p>
+            <a:r>
+              <a:rPr lang="en-US" dirty="0">
+                <a:solidFill>
+                  <a:schemeClr val="accent5">
+                    <a:lumMod val="20000"/>
+                    <a:lumOff val="80000"/>
+                  </a:schemeClr>
+                </a:solidFill>
+              </a:rPr>
+              <a:t>Created a drop-down menu to select each player to display their stats for each category</a:t>
+            </a:r>
+          </a:p>
+          <a:p>
+            <a:r>
+              <a:rPr lang="en-US" dirty="0">
+                <a:solidFill>
+                  <a:schemeClr val="accent5">
+                    <a:lumMod val="20000"/>
+                    <a:lumOff val="80000"/>
+                  </a:schemeClr>
+                </a:solidFill>
+              </a:rPr>
+              <a:t>Can use this to compare each player to see where they excel</a:t>
+            </a:r>
+          </a:p>
+        </p:txBody>
+      </p:sp>
+      <p:pic>
+        <p:nvPicPr>
+          <p:cNvPr id="13" name="Content Placeholder 12">
+            <a:extLst>
+              <a:ext uri="{FF2B5EF4-FFF2-40B4-BE49-F238E27FC236}">
+                <a16:creationId xmlns:a16="http://schemas.microsoft.com/office/drawing/2014/main" id="{2E35E8E0-29DE-C1D6-1E5B-05466745A7D4}"/>
+              </a:ext>
+            </a:extLst>
+          </p:cNvPr>
+          <p:cNvPicPr>
+            <a:picLocks noGrp="1" noChangeAspect="1"/>
+          </p:cNvPicPr>
+          <p:nvPr>
+            <p:ph sz="half" idx="2"/>
+          </p:nvPr>
+        </p:nvPicPr>
+        <p:blipFill>
+          <a:blip r:embed="rId4"/>
+          <a:stretch>
+            <a:fillRect/>
+          </a:stretch>
+        </p:blipFill>
+        <p:spPr>
+          <a:xfrm>
+            <a:off x="494146" y="2890982"/>
+            <a:ext cx="8271164" cy="3370379"/>
+          </a:xfrm>
+          <a:prstGeom prst="rect">
+            <a:avLst/>
+          </a:prstGeom>
+        </p:spPr>
+      </p:pic>
+    </p:spTree>
+    <p:extLst>
+      <p:ext uri="{BB962C8B-B14F-4D97-AF65-F5344CB8AC3E}">
+        <p14:creationId xmlns:p14="http://schemas.microsoft.com/office/powerpoint/2010/main" val="3394728805"/>
+      </p:ext>
+    </p:extLst>
+  </p:cSld>
+  <p:clrMapOvr>
+    <a:masterClrMapping/>
+  </p:clrMapOvr>
+</p:sld>
+</file>
+
 <file path=ppt/slides/slide6.xml><?xml version="1.0" encoding="utf-8"?>
 <p:sld xmlns:a="http://schemas.openxmlformats.org/drawingml/2006/main" xmlns:r="http://schemas.openxmlformats.org/officeDocument/2006/relationships" xmlns:p="http://schemas.openxmlformats.org/presentationml/2006/main">
   <p:cSld>
@@ -4910,6 +5143,45 @@
           <a:chExt cx="0" cy="0"/>
         </a:xfrm>
       </p:grpSpPr>
+      <p:pic>
+        <p:nvPicPr>
+          <p:cNvPr id="5" name="Picture 4" descr="A group of ducks in a park&#10;&#10;Description automatically generated with low confidence">
+            <a:extLst>
+              <a:ext uri="{FF2B5EF4-FFF2-40B4-BE49-F238E27FC236}">
+                <a16:creationId xmlns:a16="http://schemas.microsoft.com/office/drawing/2014/main" id="{04A7313B-776F-733C-F89C-670412FC0782}"/>
+              </a:ext>
+            </a:extLst>
+          </p:cNvPr>
+          <p:cNvPicPr>
+            <a:picLocks noChangeAspect="1"/>
+          </p:cNvPicPr>
+          <p:nvPr/>
+        </p:nvPicPr>
+        <p:blipFill>
+          <a:blip r:embed="rId2">
+            <a:extLst>
+              <a:ext uri="{28A0092B-C50C-407E-A947-70E740481C1C}">
+                <a14:useLocalDpi xmlns:a14="http://schemas.microsoft.com/office/drawing/2010/main" val="0"/>
+              </a:ext>
+              <a:ext uri="{837473B0-CC2E-450A-ABE3-18F120FF3D39}">
+                <a1611:picAttrSrcUrl xmlns:a1611="http://schemas.microsoft.com/office/drawing/2016/11/main" r:id="rId3"/>
+              </a:ext>
+            </a:extLst>
+          </a:blip>
+          <a:stretch>
+            <a:fillRect/>
+          </a:stretch>
+        </p:blipFill>
+        <p:spPr>
+          <a:xfrm>
+            <a:off x="1" y="0"/>
+            <a:ext cx="12191999" cy="6858000"/>
+          </a:xfrm>
+          <a:prstGeom prst="rect">
+            <a:avLst/>
+          </a:prstGeom>
+        </p:spPr>
+      </p:pic>
       <p:sp>
         <p:nvSpPr>
           <p:cNvPr id="2" name="Title 1">
@@ -4932,7 +5204,11 @@
           <a:lstStyle/>
           <a:p>
             <a:r>
-              <a:rPr lang="en-US" dirty="0"/>
+              <a:rPr lang="en-US" dirty="0">
+                <a:solidFill>
+                  <a:schemeClr val="bg1"/>
+                </a:solidFill>
+              </a:rPr>
               <a:t>Conclusion</a:t>
             </a:r>
           </a:p>
@@ -4955,7 +5231,7 @@
           </p:nvPr>
         </p:nvPicPr>
         <p:blipFill>
-          <a:blip r:embed="rId2"/>
+          <a:blip r:embed="rId4"/>
           <a:stretch>
             <a:fillRect/>
           </a:stretch>
@@ -4995,7 +5271,11 @@
               <a:buChar char="•"/>
             </a:pPr>
             <a:r>
-              <a:rPr lang="en-US" dirty="0"/>
+              <a:rPr lang="en-US" dirty="0">
+                <a:solidFill>
+                  <a:schemeClr val="bg1"/>
+                </a:solidFill>
+              </a:rPr>
               <a:t>The top golfers did not excel in just any specific category, but almost of them</a:t>
             </a:r>
           </a:p>
@@ -5005,7 +5285,11 @@
               <a:buChar char="•"/>
             </a:pPr>
             <a:r>
-              <a:rPr lang="en-US" dirty="0"/>
+              <a:rPr lang="en-US" dirty="0">
+                <a:solidFill>
+                  <a:schemeClr val="bg1"/>
+                </a:solidFill>
+              </a:rPr>
               <a:t>Of the 10 categories the top 10 was first in six, third in two, fourth in one, and last in one</a:t>
             </a:r>
           </a:p>
@@ -5015,7 +5299,11 @@
               <a:buChar char="•"/>
             </a:pPr>
             <a:r>
-              <a:rPr lang="en-US" dirty="0"/>
+              <a:rPr lang="en-US" dirty="0">
+                <a:solidFill>
+                  <a:schemeClr val="bg1"/>
+                </a:solidFill>
+              </a:rPr>
               <a:t>In areas where they may not excel as much such as Driving Accuracy, they greatly make up for it in other areas such as Putts per round or Approaches from inside 100 yards </a:t>
             </a:r>
           </a:p>

</xml_diff>